<commit_message>
Added animations to the CMS Kit presentation
</commit_message>
<xml_diff>
--- a/2023-09-28 ABP CMS Kit/ABP CMS Kit.pptx
+++ b/2023-09-28 ABP CMS Kit/ABP CMS Kit.pptx
@@ -4726,6 +4726,707 @@
   <p:clrMapOvr>
     <a:masterClrMapping/>
   </p:clrMapOvr>
+  <p:timing>
+    <p:tnLst>
+      <p:par>
+        <p:cTn id="1" dur="indefinite" restart="never" nodeType="tmRoot">
+          <p:childTnLst>
+            <p:seq concurrent="1" nextAc="seek">
+              <p:cTn id="2" dur="indefinite" nodeType="mainSeq">
+                <p:childTnLst>
+                  <p:par>
+                    <p:cTn id="3" fill="hold">
+                      <p:stCondLst>
+                        <p:cond delay="indefinite"/>
+                      </p:stCondLst>
+                      <p:childTnLst>
+                        <p:par>
+                          <p:cTn id="4" fill="hold">
+                            <p:stCondLst>
+                              <p:cond delay="0"/>
+                            </p:stCondLst>
+                            <p:childTnLst>
+                              <p:par>
+                                <p:cTn id="5" presetID="10" presetClass="entr" presetSubtype="0" fill="hold" nodeType="clickEffect">
+                                  <p:stCondLst>
+                                    <p:cond delay="0"/>
+                                  </p:stCondLst>
+                                  <p:childTnLst>
+                                    <p:set>
+                                      <p:cBhvr>
+                                        <p:cTn id="6" dur="1" fill="hold">
+                                          <p:stCondLst>
+                                            <p:cond delay="0"/>
+                                          </p:stCondLst>
+                                        </p:cTn>
+                                        <p:tgtEl>
+                                          <p:spTgt spid="3">
+                                            <p:txEl>
+                                              <p:pRg st="0" end="0"/>
+                                            </p:txEl>
+                                          </p:spTgt>
+                                        </p:tgtEl>
+                                        <p:attrNameLst>
+                                          <p:attrName>style.visibility</p:attrName>
+                                        </p:attrNameLst>
+                                      </p:cBhvr>
+                                      <p:to>
+                                        <p:strVal val="visible"/>
+                                      </p:to>
+                                    </p:set>
+                                    <p:animEffect transition="in" filter="fade">
+                                      <p:cBhvr>
+                                        <p:cTn id="7" dur="500"/>
+                                        <p:tgtEl>
+                                          <p:spTgt spid="3">
+                                            <p:txEl>
+                                              <p:pRg st="0" end="0"/>
+                                            </p:txEl>
+                                          </p:spTgt>
+                                        </p:tgtEl>
+                                      </p:cBhvr>
+                                    </p:animEffect>
+                                  </p:childTnLst>
+                                </p:cTn>
+                              </p:par>
+                            </p:childTnLst>
+                          </p:cTn>
+                        </p:par>
+                      </p:childTnLst>
+                    </p:cTn>
+                  </p:par>
+                  <p:par>
+                    <p:cTn id="8" fill="hold">
+                      <p:stCondLst>
+                        <p:cond delay="indefinite"/>
+                      </p:stCondLst>
+                      <p:childTnLst>
+                        <p:par>
+                          <p:cTn id="9" fill="hold">
+                            <p:stCondLst>
+                              <p:cond delay="0"/>
+                            </p:stCondLst>
+                            <p:childTnLst>
+                              <p:par>
+                                <p:cTn id="10" presetID="10" presetClass="entr" presetSubtype="0" fill="hold" nodeType="clickEffect">
+                                  <p:stCondLst>
+                                    <p:cond delay="0"/>
+                                  </p:stCondLst>
+                                  <p:childTnLst>
+                                    <p:set>
+                                      <p:cBhvr>
+                                        <p:cTn id="11" dur="1" fill="hold">
+                                          <p:stCondLst>
+                                            <p:cond delay="0"/>
+                                          </p:stCondLst>
+                                        </p:cTn>
+                                        <p:tgtEl>
+                                          <p:spTgt spid="3">
+                                            <p:txEl>
+                                              <p:pRg st="1" end="1"/>
+                                            </p:txEl>
+                                          </p:spTgt>
+                                        </p:tgtEl>
+                                        <p:attrNameLst>
+                                          <p:attrName>style.visibility</p:attrName>
+                                        </p:attrNameLst>
+                                      </p:cBhvr>
+                                      <p:to>
+                                        <p:strVal val="visible"/>
+                                      </p:to>
+                                    </p:set>
+                                    <p:animEffect transition="in" filter="fade">
+                                      <p:cBhvr>
+                                        <p:cTn id="12" dur="500"/>
+                                        <p:tgtEl>
+                                          <p:spTgt spid="3">
+                                            <p:txEl>
+                                              <p:pRg st="1" end="1"/>
+                                            </p:txEl>
+                                          </p:spTgt>
+                                        </p:tgtEl>
+                                      </p:cBhvr>
+                                    </p:animEffect>
+                                  </p:childTnLst>
+                                </p:cTn>
+                              </p:par>
+                            </p:childTnLst>
+                          </p:cTn>
+                        </p:par>
+                      </p:childTnLst>
+                    </p:cTn>
+                  </p:par>
+                  <p:par>
+                    <p:cTn id="13" fill="hold">
+                      <p:stCondLst>
+                        <p:cond delay="indefinite"/>
+                      </p:stCondLst>
+                      <p:childTnLst>
+                        <p:par>
+                          <p:cTn id="14" fill="hold">
+                            <p:stCondLst>
+                              <p:cond delay="0"/>
+                            </p:stCondLst>
+                            <p:childTnLst>
+                              <p:par>
+                                <p:cTn id="15" presetID="10" presetClass="entr" presetSubtype="0" fill="hold" nodeType="clickEffect">
+                                  <p:stCondLst>
+                                    <p:cond delay="0"/>
+                                  </p:stCondLst>
+                                  <p:childTnLst>
+                                    <p:set>
+                                      <p:cBhvr>
+                                        <p:cTn id="16" dur="1" fill="hold">
+                                          <p:stCondLst>
+                                            <p:cond delay="0"/>
+                                          </p:stCondLst>
+                                        </p:cTn>
+                                        <p:tgtEl>
+                                          <p:spTgt spid="3">
+                                            <p:txEl>
+                                              <p:pRg st="2" end="2"/>
+                                            </p:txEl>
+                                          </p:spTgt>
+                                        </p:tgtEl>
+                                        <p:attrNameLst>
+                                          <p:attrName>style.visibility</p:attrName>
+                                        </p:attrNameLst>
+                                      </p:cBhvr>
+                                      <p:to>
+                                        <p:strVal val="visible"/>
+                                      </p:to>
+                                    </p:set>
+                                    <p:animEffect transition="in" filter="fade">
+                                      <p:cBhvr>
+                                        <p:cTn id="17" dur="500"/>
+                                        <p:tgtEl>
+                                          <p:spTgt spid="3">
+                                            <p:txEl>
+                                              <p:pRg st="2" end="2"/>
+                                            </p:txEl>
+                                          </p:spTgt>
+                                        </p:tgtEl>
+                                      </p:cBhvr>
+                                    </p:animEffect>
+                                  </p:childTnLst>
+                                </p:cTn>
+                              </p:par>
+                            </p:childTnLst>
+                          </p:cTn>
+                        </p:par>
+                      </p:childTnLst>
+                    </p:cTn>
+                  </p:par>
+                  <p:par>
+                    <p:cTn id="18" fill="hold">
+                      <p:stCondLst>
+                        <p:cond delay="indefinite"/>
+                      </p:stCondLst>
+                      <p:childTnLst>
+                        <p:par>
+                          <p:cTn id="19" fill="hold">
+                            <p:stCondLst>
+                              <p:cond delay="0"/>
+                            </p:stCondLst>
+                            <p:childTnLst>
+                              <p:par>
+                                <p:cTn id="20" presetID="10" presetClass="entr" presetSubtype="0" fill="hold" nodeType="clickEffect">
+                                  <p:stCondLst>
+                                    <p:cond delay="0"/>
+                                  </p:stCondLst>
+                                  <p:childTnLst>
+                                    <p:set>
+                                      <p:cBhvr>
+                                        <p:cTn id="21" dur="1" fill="hold">
+                                          <p:stCondLst>
+                                            <p:cond delay="0"/>
+                                          </p:stCondLst>
+                                        </p:cTn>
+                                        <p:tgtEl>
+                                          <p:spTgt spid="3">
+                                            <p:txEl>
+                                              <p:pRg st="3" end="3"/>
+                                            </p:txEl>
+                                          </p:spTgt>
+                                        </p:tgtEl>
+                                        <p:attrNameLst>
+                                          <p:attrName>style.visibility</p:attrName>
+                                        </p:attrNameLst>
+                                      </p:cBhvr>
+                                      <p:to>
+                                        <p:strVal val="visible"/>
+                                      </p:to>
+                                    </p:set>
+                                    <p:animEffect transition="in" filter="fade">
+                                      <p:cBhvr>
+                                        <p:cTn id="22" dur="500"/>
+                                        <p:tgtEl>
+                                          <p:spTgt spid="3">
+                                            <p:txEl>
+                                              <p:pRg st="3" end="3"/>
+                                            </p:txEl>
+                                          </p:spTgt>
+                                        </p:tgtEl>
+                                      </p:cBhvr>
+                                    </p:animEffect>
+                                  </p:childTnLst>
+                                </p:cTn>
+                              </p:par>
+                            </p:childTnLst>
+                          </p:cTn>
+                        </p:par>
+                      </p:childTnLst>
+                    </p:cTn>
+                  </p:par>
+                  <p:par>
+                    <p:cTn id="23" fill="hold">
+                      <p:stCondLst>
+                        <p:cond delay="indefinite"/>
+                      </p:stCondLst>
+                      <p:childTnLst>
+                        <p:par>
+                          <p:cTn id="24" fill="hold">
+                            <p:stCondLst>
+                              <p:cond delay="0"/>
+                            </p:stCondLst>
+                            <p:childTnLst>
+                              <p:par>
+                                <p:cTn id="25" presetID="10" presetClass="entr" presetSubtype="0" fill="hold" nodeType="clickEffect">
+                                  <p:stCondLst>
+                                    <p:cond delay="0"/>
+                                  </p:stCondLst>
+                                  <p:childTnLst>
+                                    <p:set>
+                                      <p:cBhvr>
+                                        <p:cTn id="26" dur="1" fill="hold">
+                                          <p:stCondLst>
+                                            <p:cond delay="0"/>
+                                          </p:stCondLst>
+                                        </p:cTn>
+                                        <p:tgtEl>
+                                          <p:spTgt spid="3">
+                                            <p:txEl>
+                                              <p:pRg st="4" end="4"/>
+                                            </p:txEl>
+                                          </p:spTgt>
+                                        </p:tgtEl>
+                                        <p:attrNameLst>
+                                          <p:attrName>style.visibility</p:attrName>
+                                        </p:attrNameLst>
+                                      </p:cBhvr>
+                                      <p:to>
+                                        <p:strVal val="visible"/>
+                                      </p:to>
+                                    </p:set>
+                                    <p:animEffect transition="in" filter="fade">
+                                      <p:cBhvr>
+                                        <p:cTn id="27" dur="500"/>
+                                        <p:tgtEl>
+                                          <p:spTgt spid="3">
+                                            <p:txEl>
+                                              <p:pRg st="4" end="4"/>
+                                            </p:txEl>
+                                          </p:spTgt>
+                                        </p:tgtEl>
+                                      </p:cBhvr>
+                                    </p:animEffect>
+                                  </p:childTnLst>
+                                </p:cTn>
+                              </p:par>
+                            </p:childTnLst>
+                          </p:cTn>
+                        </p:par>
+                      </p:childTnLst>
+                    </p:cTn>
+                  </p:par>
+                  <p:par>
+                    <p:cTn id="28" fill="hold">
+                      <p:stCondLst>
+                        <p:cond delay="indefinite"/>
+                      </p:stCondLst>
+                      <p:childTnLst>
+                        <p:par>
+                          <p:cTn id="29" fill="hold">
+                            <p:stCondLst>
+                              <p:cond delay="0"/>
+                            </p:stCondLst>
+                            <p:childTnLst>
+                              <p:par>
+                                <p:cTn id="30" presetID="10" presetClass="entr" presetSubtype="0" fill="hold" nodeType="clickEffect">
+                                  <p:stCondLst>
+                                    <p:cond delay="0"/>
+                                  </p:stCondLst>
+                                  <p:childTnLst>
+                                    <p:set>
+                                      <p:cBhvr>
+                                        <p:cTn id="31" dur="1" fill="hold">
+                                          <p:stCondLst>
+                                            <p:cond delay="0"/>
+                                          </p:stCondLst>
+                                        </p:cTn>
+                                        <p:tgtEl>
+                                          <p:spTgt spid="3">
+                                            <p:txEl>
+                                              <p:pRg st="5" end="5"/>
+                                            </p:txEl>
+                                          </p:spTgt>
+                                        </p:tgtEl>
+                                        <p:attrNameLst>
+                                          <p:attrName>style.visibility</p:attrName>
+                                        </p:attrNameLst>
+                                      </p:cBhvr>
+                                      <p:to>
+                                        <p:strVal val="visible"/>
+                                      </p:to>
+                                    </p:set>
+                                    <p:animEffect transition="in" filter="fade">
+                                      <p:cBhvr>
+                                        <p:cTn id="32" dur="500"/>
+                                        <p:tgtEl>
+                                          <p:spTgt spid="3">
+                                            <p:txEl>
+                                              <p:pRg st="5" end="5"/>
+                                            </p:txEl>
+                                          </p:spTgt>
+                                        </p:tgtEl>
+                                      </p:cBhvr>
+                                    </p:animEffect>
+                                  </p:childTnLst>
+                                </p:cTn>
+                              </p:par>
+                            </p:childTnLst>
+                          </p:cTn>
+                        </p:par>
+                      </p:childTnLst>
+                    </p:cTn>
+                  </p:par>
+                  <p:par>
+                    <p:cTn id="33" fill="hold">
+                      <p:stCondLst>
+                        <p:cond delay="indefinite"/>
+                      </p:stCondLst>
+                      <p:childTnLst>
+                        <p:par>
+                          <p:cTn id="34" fill="hold">
+                            <p:stCondLst>
+                              <p:cond delay="0"/>
+                            </p:stCondLst>
+                            <p:childTnLst>
+                              <p:par>
+                                <p:cTn id="35" presetID="10" presetClass="entr" presetSubtype="0" fill="hold" nodeType="clickEffect">
+                                  <p:stCondLst>
+                                    <p:cond delay="0"/>
+                                  </p:stCondLst>
+                                  <p:childTnLst>
+                                    <p:set>
+                                      <p:cBhvr>
+                                        <p:cTn id="36" dur="1" fill="hold">
+                                          <p:stCondLst>
+                                            <p:cond delay="0"/>
+                                          </p:stCondLst>
+                                        </p:cTn>
+                                        <p:tgtEl>
+                                          <p:spTgt spid="3">
+                                            <p:txEl>
+                                              <p:pRg st="6" end="6"/>
+                                            </p:txEl>
+                                          </p:spTgt>
+                                        </p:tgtEl>
+                                        <p:attrNameLst>
+                                          <p:attrName>style.visibility</p:attrName>
+                                        </p:attrNameLst>
+                                      </p:cBhvr>
+                                      <p:to>
+                                        <p:strVal val="visible"/>
+                                      </p:to>
+                                    </p:set>
+                                    <p:animEffect transition="in" filter="fade">
+                                      <p:cBhvr>
+                                        <p:cTn id="37" dur="500"/>
+                                        <p:tgtEl>
+                                          <p:spTgt spid="3">
+                                            <p:txEl>
+                                              <p:pRg st="6" end="6"/>
+                                            </p:txEl>
+                                          </p:spTgt>
+                                        </p:tgtEl>
+                                      </p:cBhvr>
+                                    </p:animEffect>
+                                  </p:childTnLst>
+                                </p:cTn>
+                              </p:par>
+                            </p:childTnLst>
+                          </p:cTn>
+                        </p:par>
+                      </p:childTnLst>
+                    </p:cTn>
+                  </p:par>
+                  <p:par>
+                    <p:cTn id="38" fill="hold">
+                      <p:stCondLst>
+                        <p:cond delay="indefinite"/>
+                      </p:stCondLst>
+                      <p:childTnLst>
+                        <p:par>
+                          <p:cTn id="39" fill="hold">
+                            <p:stCondLst>
+                              <p:cond delay="0"/>
+                            </p:stCondLst>
+                            <p:childTnLst>
+                              <p:par>
+                                <p:cTn id="40" presetID="10" presetClass="entr" presetSubtype="0" fill="hold" nodeType="clickEffect">
+                                  <p:stCondLst>
+                                    <p:cond delay="0"/>
+                                  </p:stCondLst>
+                                  <p:childTnLst>
+                                    <p:set>
+                                      <p:cBhvr>
+                                        <p:cTn id="41" dur="1" fill="hold">
+                                          <p:stCondLst>
+                                            <p:cond delay="0"/>
+                                          </p:stCondLst>
+                                        </p:cTn>
+                                        <p:tgtEl>
+                                          <p:spTgt spid="3">
+                                            <p:txEl>
+                                              <p:pRg st="7" end="7"/>
+                                            </p:txEl>
+                                          </p:spTgt>
+                                        </p:tgtEl>
+                                        <p:attrNameLst>
+                                          <p:attrName>style.visibility</p:attrName>
+                                        </p:attrNameLst>
+                                      </p:cBhvr>
+                                      <p:to>
+                                        <p:strVal val="visible"/>
+                                      </p:to>
+                                    </p:set>
+                                    <p:animEffect transition="in" filter="fade">
+                                      <p:cBhvr>
+                                        <p:cTn id="42" dur="500"/>
+                                        <p:tgtEl>
+                                          <p:spTgt spid="3">
+                                            <p:txEl>
+                                              <p:pRg st="7" end="7"/>
+                                            </p:txEl>
+                                          </p:spTgt>
+                                        </p:tgtEl>
+                                      </p:cBhvr>
+                                    </p:animEffect>
+                                  </p:childTnLst>
+                                </p:cTn>
+                              </p:par>
+                            </p:childTnLst>
+                          </p:cTn>
+                        </p:par>
+                      </p:childTnLst>
+                    </p:cTn>
+                  </p:par>
+                  <p:par>
+                    <p:cTn id="43" fill="hold">
+                      <p:stCondLst>
+                        <p:cond delay="indefinite"/>
+                      </p:stCondLst>
+                      <p:childTnLst>
+                        <p:par>
+                          <p:cTn id="44" fill="hold">
+                            <p:stCondLst>
+                              <p:cond delay="0"/>
+                            </p:stCondLst>
+                            <p:childTnLst>
+                              <p:par>
+                                <p:cTn id="45" presetID="10" presetClass="entr" presetSubtype="0" fill="hold" nodeType="clickEffect">
+                                  <p:stCondLst>
+                                    <p:cond delay="0"/>
+                                  </p:stCondLst>
+                                  <p:childTnLst>
+                                    <p:set>
+                                      <p:cBhvr>
+                                        <p:cTn id="46" dur="1" fill="hold">
+                                          <p:stCondLst>
+                                            <p:cond delay="0"/>
+                                          </p:stCondLst>
+                                        </p:cTn>
+                                        <p:tgtEl>
+                                          <p:spTgt spid="3">
+                                            <p:txEl>
+                                              <p:pRg st="8" end="8"/>
+                                            </p:txEl>
+                                          </p:spTgt>
+                                        </p:tgtEl>
+                                        <p:attrNameLst>
+                                          <p:attrName>style.visibility</p:attrName>
+                                        </p:attrNameLst>
+                                      </p:cBhvr>
+                                      <p:to>
+                                        <p:strVal val="visible"/>
+                                      </p:to>
+                                    </p:set>
+                                    <p:animEffect transition="in" filter="fade">
+                                      <p:cBhvr>
+                                        <p:cTn id="47" dur="500"/>
+                                        <p:tgtEl>
+                                          <p:spTgt spid="3">
+                                            <p:txEl>
+                                              <p:pRg st="8" end="8"/>
+                                            </p:txEl>
+                                          </p:spTgt>
+                                        </p:tgtEl>
+                                      </p:cBhvr>
+                                    </p:animEffect>
+                                  </p:childTnLst>
+                                </p:cTn>
+                              </p:par>
+                            </p:childTnLst>
+                          </p:cTn>
+                        </p:par>
+                      </p:childTnLst>
+                    </p:cTn>
+                  </p:par>
+                  <p:par>
+                    <p:cTn id="48" fill="hold">
+                      <p:stCondLst>
+                        <p:cond delay="indefinite"/>
+                      </p:stCondLst>
+                      <p:childTnLst>
+                        <p:par>
+                          <p:cTn id="49" fill="hold">
+                            <p:stCondLst>
+                              <p:cond delay="0"/>
+                            </p:stCondLst>
+                            <p:childTnLst>
+                              <p:par>
+                                <p:cTn id="50" presetID="10" presetClass="entr" presetSubtype="0" fill="hold" nodeType="clickEffect">
+                                  <p:stCondLst>
+                                    <p:cond delay="0"/>
+                                  </p:stCondLst>
+                                  <p:childTnLst>
+                                    <p:set>
+                                      <p:cBhvr>
+                                        <p:cTn id="51" dur="1" fill="hold">
+                                          <p:stCondLst>
+                                            <p:cond delay="0"/>
+                                          </p:stCondLst>
+                                        </p:cTn>
+                                        <p:tgtEl>
+                                          <p:spTgt spid="3">
+                                            <p:txEl>
+                                              <p:pRg st="9" end="9"/>
+                                            </p:txEl>
+                                          </p:spTgt>
+                                        </p:tgtEl>
+                                        <p:attrNameLst>
+                                          <p:attrName>style.visibility</p:attrName>
+                                        </p:attrNameLst>
+                                      </p:cBhvr>
+                                      <p:to>
+                                        <p:strVal val="visible"/>
+                                      </p:to>
+                                    </p:set>
+                                    <p:animEffect transition="in" filter="fade">
+                                      <p:cBhvr>
+                                        <p:cTn id="52" dur="500"/>
+                                        <p:tgtEl>
+                                          <p:spTgt spid="3">
+                                            <p:txEl>
+                                              <p:pRg st="9" end="9"/>
+                                            </p:txEl>
+                                          </p:spTgt>
+                                        </p:tgtEl>
+                                      </p:cBhvr>
+                                    </p:animEffect>
+                                  </p:childTnLst>
+                                </p:cTn>
+                              </p:par>
+                            </p:childTnLst>
+                          </p:cTn>
+                        </p:par>
+                      </p:childTnLst>
+                    </p:cTn>
+                  </p:par>
+                  <p:par>
+                    <p:cTn id="53" fill="hold">
+                      <p:stCondLst>
+                        <p:cond delay="indefinite"/>
+                      </p:stCondLst>
+                      <p:childTnLst>
+                        <p:par>
+                          <p:cTn id="54" fill="hold">
+                            <p:stCondLst>
+                              <p:cond delay="0"/>
+                            </p:stCondLst>
+                            <p:childTnLst>
+                              <p:par>
+                                <p:cTn id="55" presetID="10" presetClass="entr" presetSubtype="0" fill="hold" nodeType="clickEffect">
+                                  <p:stCondLst>
+                                    <p:cond delay="0"/>
+                                  </p:stCondLst>
+                                  <p:childTnLst>
+                                    <p:set>
+                                      <p:cBhvr>
+                                        <p:cTn id="56" dur="1" fill="hold">
+                                          <p:stCondLst>
+                                            <p:cond delay="0"/>
+                                          </p:stCondLst>
+                                        </p:cTn>
+                                        <p:tgtEl>
+                                          <p:spTgt spid="3">
+                                            <p:txEl>
+                                              <p:pRg st="10" end="10"/>
+                                            </p:txEl>
+                                          </p:spTgt>
+                                        </p:tgtEl>
+                                        <p:attrNameLst>
+                                          <p:attrName>style.visibility</p:attrName>
+                                        </p:attrNameLst>
+                                      </p:cBhvr>
+                                      <p:to>
+                                        <p:strVal val="visible"/>
+                                      </p:to>
+                                    </p:set>
+                                    <p:animEffect transition="in" filter="fade">
+                                      <p:cBhvr>
+                                        <p:cTn id="57" dur="500"/>
+                                        <p:tgtEl>
+                                          <p:spTgt spid="3">
+                                            <p:txEl>
+                                              <p:pRg st="10" end="10"/>
+                                            </p:txEl>
+                                          </p:spTgt>
+                                        </p:tgtEl>
+                                      </p:cBhvr>
+                                    </p:animEffect>
+                                  </p:childTnLst>
+                                </p:cTn>
+                              </p:par>
+                            </p:childTnLst>
+                          </p:cTn>
+                        </p:par>
+                      </p:childTnLst>
+                    </p:cTn>
+                  </p:par>
+                </p:childTnLst>
+              </p:cTn>
+              <p:prevCondLst>
+                <p:cond evt="onPrev" delay="0">
+                  <p:tgtEl>
+                    <p:sldTgt/>
+                  </p:tgtEl>
+                </p:cond>
+              </p:prevCondLst>
+              <p:nextCondLst>
+                <p:cond evt="onNext" delay="0">
+                  <p:tgtEl>
+                    <p:sldTgt/>
+                  </p:tgtEl>
+                </p:cond>
+              </p:nextCondLst>
+            </p:seq>
+          </p:childTnLst>
+        </p:cTn>
+      </p:par>
+    </p:tnLst>
+  </p:timing>
 </p:sld>
 </file>
 
@@ -5145,6 +5846,158 @@
   <p:clrMapOvr>
     <a:masterClrMapping/>
   </p:clrMapOvr>
+  <p:timing>
+    <p:tnLst>
+      <p:par>
+        <p:cTn id="1" dur="indefinite" restart="never" nodeType="tmRoot">
+          <p:childTnLst>
+            <p:seq concurrent="1" nextAc="seek">
+              <p:cTn id="2" dur="indefinite" nodeType="mainSeq">
+                <p:childTnLst>
+                  <p:par>
+                    <p:cTn id="3" fill="hold">
+                      <p:stCondLst>
+                        <p:cond delay="indefinite"/>
+                      </p:stCondLst>
+                      <p:childTnLst>
+                        <p:par>
+                          <p:cTn id="4" fill="hold">
+                            <p:stCondLst>
+                              <p:cond delay="0"/>
+                            </p:stCondLst>
+                            <p:childTnLst>
+                              <p:par>
+                                <p:cTn id="5" presetID="10" presetClass="entr" presetSubtype="0" fill="hold" nodeType="clickEffect">
+                                  <p:stCondLst>
+                                    <p:cond delay="0"/>
+                                  </p:stCondLst>
+                                  <p:childTnLst>
+                                    <p:set>
+                                      <p:cBhvr>
+                                        <p:cTn id="6" dur="1" fill="hold">
+                                          <p:stCondLst>
+                                            <p:cond delay="0"/>
+                                          </p:stCondLst>
+                                        </p:cTn>
+                                        <p:tgtEl>
+                                          <p:spTgt spid="3">
+                                            <p:txEl>
+                                              <p:pRg st="1" end="1"/>
+                                            </p:txEl>
+                                          </p:spTgt>
+                                        </p:tgtEl>
+                                        <p:attrNameLst>
+                                          <p:attrName>style.visibility</p:attrName>
+                                        </p:attrNameLst>
+                                      </p:cBhvr>
+                                      <p:to>
+                                        <p:strVal val="visible"/>
+                                      </p:to>
+                                    </p:set>
+                                    <p:animEffect transition="in" filter="fade">
+                                      <p:cBhvr>
+                                        <p:cTn id="7" dur="500"/>
+                                        <p:tgtEl>
+                                          <p:spTgt spid="3">
+                                            <p:txEl>
+                                              <p:pRg st="1" end="1"/>
+                                            </p:txEl>
+                                          </p:spTgt>
+                                        </p:tgtEl>
+                                      </p:cBhvr>
+                                    </p:animEffect>
+                                  </p:childTnLst>
+                                </p:cTn>
+                              </p:par>
+                            </p:childTnLst>
+                          </p:cTn>
+                        </p:par>
+                      </p:childTnLst>
+                    </p:cTn>
+                  </p:par>
+                  <p:par>
+                    <p:cTn id="8" fill="hold">
+                      <p:stCondLst>
+                        <p:cond delay="indefinite"/>
+                      </p:stCondLst>
+                      <p:childTnLst>
+                        <p:par>
+                          <p:cTn id="9" fill="hold">
+                            <p:stCondLst>
+                              <p:cond delay="0"/>
+                            </p:stCondLst>
+                            <p:childTnLst>
+                              <p:par>
+                                <p:cTn id="10" presetID="10" presetClass="entr" presetSubtype="0" fill="hold" nodeType="clickEffect">
+                                  <p:stCondLst>
+                                    <p:cond delay="0"/>
+                                  </p:stCondLst>
+                                  <p:childTnLst>
+                                    <p:set>
+                                      <p:cBhvr>
+                                        <p:cTn id="11" dur="1" fill="hold">
+                                          <p:stCondLst>
+                                            <p:cond delay="0"/>
+                                          </p:stCondLst>
+                                        </p:cTn>
+                                        <p:tgtEl>
+                                          <p:spTgt spid="3">
+                                            <p:txEl>
+                                              <p:pRg st="3" end="3"/>
+                                            </p:txEl>
+                                          </p:spTgt>
+                                        </p:tgtEl>
+                                        <p:attrNameLst>
+                                          <p:attrName>style.visibility</p:attrName>
+                                        </p:attrNameLst>
+                                      </p:cBhvr>
+                                      <p:to>
+                                        <p:strVal val="visible"/>
+                                      </p:to>
+                                    </p:set>
+                                    <p:animEffect transition="in" filter="fade">
+                                      <p:cBhvr>
+                                        <p:cTn id="12" dur="500"/>
+                                        <p:tgtEl>
+                                          <p:spTgt spid="3">
+                                            <p:txEl>
+                                              <p:pRg st="3" end="3"/>
+                                            </p:txEl>
+                                          </p:spTgt>
+                                        </p:tgtEl>
+                                      </p:cBhvr>
+                                    </p:animEffect>
+                                  </p:childTnLst>
+                                </p:cTn>
+                              </p:par>
+                            </p:childTnLst>
+                          </p:cTn>
+                        </p:par>
+                      </p:childTnLst>
+                    </p:cTn>
+                  </p:par>
+                </p:childTnLst>
+              </p:cTn>
+              <p:prevCondLst>
+                <p:cond evt="onPrev" delay="0">
+                  <p:tgtEl>
+                    <p:sldTgt/>
+                  </p:tgtEl>
+                </p:cond>
+              </p:prevCondLst>
+              <p:nextCondLst>
+                <p:cond evt="onNext" delay="0">
+                  <p:tgtEl>
+                    <p:sldTgt/>
+                  </p:tgtEl>
+                </p:cond>
+              </p:nextCondLst>
+            </p:seq>
+          </p:childTnLst>
+        </p:cTn>
+      </p:par>
+    </p:tnLst>
+  </p:timing>
 </p:sld>
 </file>
 
@@ -5352,6 +6205,158 @@
   <p:clrMapOvr>
     <a:masterClrMapping/>
   </p:clrMapOvr>
+  <p:timing>
+    <p:tnLst>
+      <p:par>
+        <p:cTn id="1" dur="indefinite" restart="never" nodeType="tmRoot">
+          <p:childTnLst>
+            <p:seq concurrent="1" nextAc="seek">
+              <p:cTn id="2" dur="indefinite" nodeType="mainSeq">
+                <p:childTnLst>
+                  <p:par>
+                    <p:cTn id="3" fill="hold">
+                      <p:stCondLst>
+                        <p:cond delay="indefinite"/>
+                      </p:stCondLst>
+                      <p:childTnLst>
+                        <p:par>
+                          <p:cTn id="4" fill="hold">
+                            <p:stCondLst>
+                              <p:cond delay="0"/>
+                            </p:stCondLst>
+                            <p:childTnLst>
+                              <p:par>
+                                <p:cTn id="5" presetID="10" presetClass="entr" presetSubtype="0" fill="hold" nodeType="clickEffect">
+                                  <p:stCondLst>
+                                    <p:cond delay="0"/>
+                                  </p:stCondLst>
+                                  <p:childTnLst>
+                                    <p:set>
+                                      <p:cBhvr>
+                                        <p:cTn id="6" dur="1" fill="hold">
+                                          <p:stCondLst>
+                                            <p:cond delay="0"/>
+                                          </p:stCondLst>
+                                        </p:cTn>
+                                        <p:tgtEl>
+                                          <p:spTgt spid="3">
+                                            <p:txEl>
+                                              <p:pRg st="0" end="0"/>
+                                            </p:txEl>
+                                          </p:spTgt>
+                                        </p:tgtEl>
+                                        <p:attrNameLst>
+                                          <p:attrName>style.visibility</p:attrName>
+                                        </p:attrNameLst>
+                                      </p:cBhvr>
+                                      <p:to>
+                                        <p:strVal val="visible"/>
+                                      </p:to>
+                                    </p:set>
+                                    <p:animEffect transition="in" filter="fade">
+                                      <p:cBhvr>
+                                        <p:cTn id="7" dur="500"/>
+                                        <p:tgtEl>
+                                          <p:spTgt spid="3">
+                                            <p:txEl>
+                                              <p:pRg st="0" end="0"/>
+                                            </p:txEl>
+                                          </p:spTgt>
+                                        </p:tgtEl>
+                                      </p:cBhvr>
+                                    </p:animEffect>
+                                  </p:childTnLst>
+                                </p:cTn>
+                              </p:par>
+                            </p:childTnLst>
+                          </p:cTn>
+                        </p:par>
+                      </p:childTnLst>
+                    </p:cTn>
+                  </p:par>
+                  <p:par>
+                    <p:cTn id="8" fill="hold">
+                      <p:stCondLst>
+                        <p:cond delay="indefinite"/>
+                      </p:stCondLst>
+                      <p:childTnLst>
+                        <p:par>
+                          <p:cTn id="9" fill="hold">
+                            <p:stCondLst>
+                              <p:cond delay="0"/>
+                            </p:stCondLst>
+                            <p:childTnLst>
+                              <p:par>
+                                <p:cTn id="10" presetID="10" presetClass="entr" presetSubtype="0" fill="hold" nodeType="clickEffect">
+                                  <p:stCondLst>
+                                    <p:cond delay="0"/>
+                                  </p:stCondLst>
+                                  <p:childTnLst>
+                                    <p:set>
+                                      <p:cBhvr>
+                                        <p:cTn id="11" dur="1" fill="hold">
+                                          <p:stCondLst>
+                                            <p:cond delay="0"/>
+                                          </p:stCondLst>
+                                        </p:cTn>
+                                        <p:tgtEl>
+                                          <p:spTgt spid="3">
+                                            <p:txEl>
+                                              <p:pRg st="1" end="1"/>
+                                            </p:txEl>
+                                          </p:spTgt>
+                                        </p:tgtEl>
+                                        <p:attrNameLst>
+                                          <p:attrName>style.visibility</p:attrName>
+                                        </p:attrNameLst>
+                                      </p:cBhvr>
+                                      <p:to>
+                                        <p:strVal val="visible"/>
+                                      </p:to>
+                                    </p:set>
+                                    <p:animEffect transition="in" filter="fade">
+                                      <p:cBhvr>
+                                        <p:cTn id="12" dur="500"/>
+                                        <p:tgtEl>
+                                          <p:spTgt spid="3">
+                                            <p:txEl>
+                                              <p:pRg st="1" end="1"/>
+                                            </p:txEl>
+                                          </p:spTgt>
+                                        </p:tgtEl>
+                                      </p:cBhvr>
+                                    </p:animEffect>
+                                  </p:childTnLst>
+                                </p:cTn>
+                              </p:par>
+                            </p:childTnLst>
+                          </p:cTn>
+                        </p:par>
+                      </p:childTnLst>
+                    </p:cTn>
+                  </p:par>
+                </p:childTnLst>
+              </p:cTn>
+              <p:prevCondLst>
+                <p:cond evt="onPrev" delay="0">
+                  <p:tgtEl>
+                    <p:sldTgt/>
+                  </p:tgtEl>
+                </p:cond>
+              </p:prevCondLst>
+              <p:nextCondLst>
+                <p:cond evt="onNext" delay="0">
+                  <p:tgtEl>
+                    <p:sldTgt/>
+                  </p:tgtEl>
+                </p:cond>
+              </p:nextCondLst>
+            </p:seq>
+          </p:childTnLst>
+        </p:cTn>
+      </p:par>
+    </p:tnLst>
+  </p:timing>
 </p:sld>
 </file>
 
@@ -5574,6 +6579,262 @@
   <p:clrMapOvr>
     <a:masterClrMapping/>
   </p:clrMapOvr>
+  <p:timing>
+    <p:tnLst>
+      <p:par>
+        <p:cTn id="1" dur="indefinite" restart="never" nodeType="tmRoot">
+          <p:childTnLst>
+            <p:seq concurrent="1" nextAc="seek">
+              <p:cTn id="2" dur="indefinite" nodeType="mainSeq">
+                <p:childTnLst>
+                  <p:par>
+                    <p:cTn id="3" fill="hold">
+                      <p:stCondLst>
+                        <p:cond delay="indefinite"/>
+                      </p:stCondLst>
+                      <p:childTnLst>
+                        <p:par>
+                          <p:cTn id="4" fill="hold">
+                            <p:stCondLst>
+                              <p:cond delay="0"/>
+                            </p:stCondLst>
+                            <p:childTnLst>
+                              <p:par>
+                                <p:cTn id="5" presetID="10" presetClass="entr" presetSubtype="0" fill="hold" nodeType="clickEffect">
+                                  <p:stCondLst>
+                                    <p:cond delay="0"/>
+                                  </p:stCondLst>
+                                  <p:childTnLst>
+                                    <p:set>
+                                      <p:cBhvr>
+                                        <p:cTn id="6" dur="1" fill="hold">
+                                          <p:stCondLst>
+                                            <p:cond delay="0"/>
+                                          </p:stCondLst>
+                                        </p:cTn>
+                                        <p:tgtEl>
+                                          <p:spTgt spid="3">
+                                            <p:txEl>
+                                              <p:pRg st="0" end="0"/>
+                                            </p:txEl>
+                                          </p:spTgt>
+                                        </p:tgtEl>
+                                        <p:attrNameLst>
+                                          <p:attrName>style.visibility</p:attrName>
+                                        </p:attrNameLst>
+                                      </p:cBhvr>
+                                      <p:to>
+                                        <p:strVal val="visible"/>
+                                      </p:to>
+                                    </p:set>
+                                    <p:animEffect transition="in" filter="fade">
+                                      <p:cBhvr>
+                                        <p:cTn id="7" dur="500"/>
+                                        <p:tgtEl>
+                                          <p:spTgt spid="3">
+                                            <p:txEl>
+                                              <p:pRg st="0" end="0"/>
+                                            </p:txEl>
+                                          </p:spTgt>
+                                        </p:tgtEl>
+                                      </p:cBhvr>
+                                    </p:animEffect>
+                                  </p:childTnLst>
+                                </p:cTn>
+                              </p:par>
+                            </p:childTnLst>
+                          </p:cTn>
+                        </p:par>
+                      </p:childTnLst>
+                    </p:cTn>
+                  </p:par>
+                  <p:par>
+                    <p:cTn id="8" fill="hold">
+                      <p:stCondLst>
+                        <p:cond delay="indefinite"/>
+                      </p:stCondLst>
+                      <p:childTnLst>
+                        <p:par>
+                          <p:cTn id="9" fill="hold">
+                            <p:stCondLst>
+                              <p:cond delay="0"/>
+                            </p:stCondLst>
+                            <p:childTnLst>
+                              <p:par>
+                                <p:cTn id="10" presetID="10" presetClass="entr" presetSubtype="0" fill="hold" nodeType="clickEffect">
+                                  <p:stCondLst>
+                                    <p:cond delay="0"/>
+                                  </p:stCondLst>
+                                  <p:childTnLst>
+                                    <p:set>
+                                      <p:cBhvr>
+                                        <p:cTn id="11" dur="1" fill="hold">
+                                          <p:stCondLst>
+                                            <p:cond delay="0"/>
+                                          </p:stCondLst>
+                                        </p:cTn>
+                                        <p:tgtEl>
+                                          <p:spTgt spid="3">
+                                            <p:txEl>
+                                              <p:pRg st="1" end="1"/>
+                                            </p:txEl>
+                                          </p:spTgt>
+                                        </p:tgtEl>
+                                        <p:attrNameLst>
+                                          <p:attrName>style.visibility</p:attrName>
+                                        </p:attrNameLst>
+                                      </p:cBhvr>
+                                      <p:to>
+                                        <p:strVal val="visible"/>
+                                      </p:to>
+                                    </p:set>
+                                    <p:animEffect transition="in" filter="fade">
+                                      <p:cBhvr>
+                                        <p:cTn id="12" dur="500"/>
+                                        <p:tgtEl>
+                                          <p:spTgt spid="3">
+                                            <p:txEl>
+                                              <p:pRg st="1" end="1"/>
+                                            </p:txEl>
+                                          </p:spTgt>
+                                        </p:tgtEl>
+                                      </p:cBhvr>
+                                    </p:animEffect>
+                                  </p:childTnLst>
+                                </p:cTn>
+                              </p:par>
+                            </p:childTnLst>
+                          </p:cTn>
+                        </p:par>
+                      </p:childTnLst>
+                    </p:cTn>
+                  </p:par>
+                  <p:par>
+                    <p:cTn id="13" fill="hold">
+                      <p:stCondLst>
+                        <p:cond delay="indefinite"/>
+                      </p:stCondLst>
+                      <p:childTnLst>
+                        <p:par>
+                          <p:cTn id="14" fill="hold">
+                            <p:stCondLst>
+                              <p:cond delay="0"/>
+                            </p:stCondLst>
+                            <p:childTnLst>
+                              <p:par>
+                                <p:cTn id="15" presetID="10" presetClass="entr" presetSubtype="0" fill="hold" nodeType="clickEffect">
+                                  <p:stCondLst>
+                                    <p:cond delay="0"/>
+                                  </p:stCondLst>
+                                  <p:childTnLst>
+                                    <p:set>
+                                      <p:cBhvr>
+                                        <p:cTn id="16" dur="1" fill="hold">
+                                          <p:stCondLst>
+                                            <p:cond delay="0"/>
+                                          </p:stCondLst>
+                                        </p:cTn>
+                                        <p:tgtEl>
+                                          <p:spTgt spid="3">
+                                            <p:txEl>
+                                              <p:pRg st="2" end="2"/>
+                                            </p:txEl>
+                                          </p:spTgt>
+                                        </p:tgtEl>
+                                        <p:attrNameLst>
+                                          <p:attrName>style.visibility</p:attrName>
+                                        </p:attrNameLst>
+                                      </p:cBhvr>
+                                      <p:to>
+                                        <p:strVal val="visible"/>
+                                      </p:to>
+                                    </p:set>
+                                    <p:animEffect transition="in" filter="fade">
+                                      <p:cBhvr>
+                                        <p:cTn id="17" dur="500"/>
+                                        <p:tgtEl>
+                                          <p:spTgt spid="3">
+                                            <p:txEl>
+                                              <p:pRg st="2" end="2"/>
+                                            </p:txEl>
+                                          </p:spTgt>
+                                        </p:tgtEl>
+                                      </p:cBhvr>
+                                    </p:animEffect>
+                                  </p:childTnLst>
+                                </p:cTn>
+                              </p:par>
+                              <p:par>
+                                <p:cTn id="18" presetID="10" presetClass="entr" presetSubtype="0" fill="hold" nodeType="withEffect">
+                                  <p:stCondLst>
+                                    <p:cond delay="0"/>
+                                  </p:stCondLst>
+                                  <p:childTnLst>
+                                    <p:set>
+                                      <p:cBhvr>
+                                        <p:cTn id="19" dur="1" fill="hold">
+                                          <p:stCondLst>
+                                            <p:cond delay="0"/>
+                                          </p:stCondLst>
+                                        </p:cTn>
+                                        <p:tgtEl>
+                                          <p:spTgt spid="3">
+                                            <p:txEl>
+                                              <p:pRg st="3" end="3"/>
+                                            </p:txEl>
+                                          </p:spTgt>
+                                        </p:tgtEl>
+                                        <p:attrNameLst>
+                                          <p:attrName>style.visibility</p:attrName>
+                                        </p:attrNameLst>
+                                      </p:cBhvr>
+                                      <p:to>
+                                        <p:strVal val="visible"/>
+                                      </p:to>
+                                    </p:set>
+                                    <p:animEffect transition="in" filter="fade">
+                                      <p:cBhvr>
+                                        <p:cTn id="20" dur="500"/>
+                                        <p:tgtEl>
+                                          <p:spTgt spid="3">
+                                            <p:txEl>
+                                              <p:pRg st="3" end="3"/>
+                                            </p:txEl>
+                                          </p:spTgt>
+                                        </p:tgtEl>
+                                      </p:cBhvr>
+                                    </p:animEffect>
+                                  </p:childTnLst>
+                                </p:cTn>
+                              </p:par>
+                            </p:childTnLst>
+                          </p:cTn>
+                        </p:par>
+                      </p:childTnLst>
+                    </p:cTn>
+                  </p:par>
+                </p:childTnLst>
+              </p:cTn>
+              <p:prevCondLst>
+                <p:cond evt="onPrev" delay="0">
+                  <p:tgtEl>
+                    <p:sldTgt/>
+                  </p:tgtEl>
+                </p:cond>
+              </p:prevCondLst>
+              <p:nextCondLst>
+                <p:cond evt="onNext" delay="0">
+                  <p:tgtEl>
+                    <p:sldTgt/>
+                  </p:tgtEl>
+                </p:cond>
+              </p:nextCondLst>
+            </p:seq>
+          </p:childTnLst>
+        </p:cTn>
+      </p:par>
+    </p:tnLst>
+  </p:timing>
 </p:sld>
 </file>
 
@@ -5735,7 +6996,7 @@
                   </a:schemeClr>
                 </a:solidFill>
               </a:rPr>
-              <a:t>: Manage your application’s main menu on the fly.</a:t>
+              <a:t>: Manage your application’s main menu on the fly</a:t>
             </a:r>
           </a:p>
           <a:p>
@@ -5756,7 +7017,7 @@
                   </a:schemeClr>
                 </a:solidFill>
               </a:rPr>
-              <a:t>: Tag any kind of content, like a blog post.</a:t>
+              <a:t>: Tag any kind of content, like a blog post</a:t>
             </a:r>
           </a:p>
           <a:p>
@@ -5777,7 +7038,7 @@
                   </a:schemeClr>
                 </a:solidFill>
               </a:rPr>
-              <a:t>: Allow users to comment and discuss in your application.</a:t>
+              <a:t>: Allow users to comment and discuss in your application</a:t>
             </a:r>
           </a:p>
           <a:p>
@@ -5798,7 +7059,7 @@
                   </a:schemeClr>
                 </a:solidFill>
               </a:rPr>
-              <a:t>: Allow users to react to your contents using simple smileys.</a:t>
+              <a:t>: Allow users to react to your contents using simple smileys</a:t>
             </a:r>
           </a:p>
           <a:p>
@@ -5861,7 +7122,7 @@
                   </a:schemeClr>
                 </a:solidFill>
               </a:rPr>
-              <a:t>: Build widgets and use it in dynamic contents, like blog posts.</a:t>
+              <a:t>: Build widgets and use it in dynamic contents, like blog posts</a:t>
             </a:r>
           </a:p>
         </p:txBody>
@@ -5876,6 +7137,585 @@
   <p:clrMapOvr>
     <a:masterClrMapping/>
   </p:clrMapOvr>
+  <p:timing>
+    <p:tnLst>
+      <p:par>
+        <p:cTn id="1" dur="indefinite" restart="never" nodeType="tmRoot">
+          <p:childTnLst>
+            <p:seq concurrent="1" nextAc="seek">
+              <p:cTn id="2" dur="indefinite" nodeType="mainSeq">
+                <p:childTnLst>
+                  <p:par>
+                    <p:cTn id="3" fill="hold">
+                      <p:stCondLst>
+                        <p:cond delay="indefinite"/>
+                      </p:stCondLst>
+                      <p:childTnLst>
+                        <p:par>
+                          <p:cTn id="4" fill="hold">
+                            <p:stCondLst>
+                              <p:cond delay="0"/>
+                            </p:stCondLst>
+                            <p:childTnLst>
+                              <p:par>
+                                <p:cTn id="5" presetID="10" presetClass="entr" presetSubtype="0" fill="hold" nodeType="clickEffect">
+                                  <p:stCondLst>
+                                    <p:cond delay="0"/>
+                                  </p:stCondLst>
+                                  <p:childTnLst>
+                                    <p:set>
+                                      <p:cBhvr>
+                                        <p:cTn id="6" dur="1" fill="hold">
+                                          <p:stCondLst>
+                                            <p:cond delay="0"/>
+                                          </p:stCondLst>
+                                        </p:cTn>
+                                        <p:tgtEl>
+                                          <p:spTgt spid="3">
+                                            <p:txEl>
+                                              <p:pRg st="0" end="0"/>
+                                            </p:txEl>
+                                          </p:spTgt>
+                                        </p:tgtEl>
+                                        <p:attrNameLst>
+                                          <p:attrName>style.visibility</p:attrName>
+                                        </p:attrNameLst>
+                                      </p:cBhvr>
+                                      <p:to>
+                                        <p:strVal val="visible"/>
+                                      </p:to>
+                                    </p:set>
+                                    <p:animEffect transition="in" filter="fade">
+                                      <p:cBhvr>
+                                        <p:cTn id="7" dur="500"/>
+                                        <p:tgtEl>
+                                          <p:spTgt spid="3">
+                                            <p:txEl>
+                                              <p:pRg st="0" end="0"/>
+                                            </p:txEl>
+                                          </p:spTgt>
+                                        </p:tgtEl>
+                                      </p:cBhvr>
+                                    </p:animEffect>
+                                  </p:childTnLst>
+                                </p:cTn>
+                              </p:par>
+                            </p:childTnLst>
+                          </p:cTn>
+                        </p:par>
+                      </p:childTnLst>
+                    </p:cTn>
+                  </p:par>
+                  <p:par>
+                    <p:cTn id="8" fill="hold">
+                      <p:stCondLst>
+                        <p:cond delay="indefinite"/>
+                      </p:stCondLst>
+                      <p:childTnLst>
+                        <p:par>
+                          <p:cTn id="9" fill="hold">
+                            <p:stCondLst>
+                              <p:cond delay="0"/>
+                            </p:stCondLst>
+                            <p:childTnLst>
+                              <p:par>
+                                <p:cTn id="10" presetID="10" presetClass="entr" presetSubtype="0" fill="hold" nodeType="clickEffect">
+                                  <p:stCondLst>
+                                    <p:cond delay="0"/>
+                                  </p:stCondLst>
+                                  <p:childTnLst>
+                                    <p:set>
+                                      <p:cBhvr>
+                                        <p:cTn id="11" dur="1" fill="hold">
+                                          <p:stCondLst>
+                                            <p:cond delay="0"/>
+                                          </p:stCondLst>
+                                        </p:cTn>
+                                        <p:tgtEl>
+                                          <p:spTgt spid="3">
+                                            <p:txEl>
+                                              <p:pRg st="1" end="1"/>
+                                            </p:txEl>
+                                          </p:spTgt>
+                                        </p:tgtEl>
+                                        <p:attrNameLst>
+                                          <p:attrName>style.visibility</p:attrName>
+                                        </p:attrNameLst>
+                                      </p:cBhvr>
+                                      <p:to>
+                                        <p:strVal val="visible"/>
+                                      </p:to>
+                                    </p:set>
+                                    <p:animEffect transition="in" filter="fade">
+                                      <p:cBhvr>
+                                        <p:cTn id="12" dur="500"/>
+                                        <p:tgtEl>
+                                          <p:spTgt spid="3">
+                                            <p:txEl>
+                                              <p:pRg st="1" end="1"/>
+                                            </p:txEl>
+                                          </p:spTgt>
+                                        </p:tgtEl>
+                                      </p:cBhvr>
+                                    </p:animEffect>
+                                  </p:childTnLst>
+                                </p:cTn>
+                              </p:par>
+                            </p:childTnLst>
+                          </p:cTn>
+                        </p:par>
+                      </p:childTnLst>
+                    </p:cTn>
+                  </p:par>
+                  <p:par>
+                    <p:cTn id="13" fill="hold">
+                      <p:stCondLst>
+                        <p:cond delay="indefinite"/>
+                      </p:stCondLst>
+                      <p:childTnLst>
+                        <p:par>
+                          <p:cTn id="14" fill="hold">
+                            <p:stCondLst>
+                              <p:cond delay="0"/>
+                            </p:stCondLst>
+                            <p:childTnLst>
+                              <p:par>
+                                <p:cTn id="15" presetID="10" presetClass="entr" presetSubtype="0" fill="hold" nodeType="clickEffect">
+                                  <p:stCondLst>
+                                    <p:cond delay="0"/>
+                                  </p:stCondLst>
+                                  <p:childTnLst>
+                                    <p:set>
+                                      <p:cBhvr>
+                                        <p:cTn id="16" dur="1" fill="hold">
+                                          <p:stCondLst>
+                                            <p:cond delay="0"/>
+                                          </p:stCondLst>
+                                        </p:cTn>
+                                        <p:tgtEl>
+                                          <p:spTgt spid="3">
+                                            <p:txEl>
+                                              <p:pRg st="2" end="2"/>
+                                            </p:txEl>
+                                          </p:spTgt>
+                                        </p:tgtEl>
+                                        <p:attrNameLst>
+                                          <p:attrName>style.visibility</p:attrName>
+                                        </p:attrNameLst>
+                                      </p:cBhvr>
+                                      <p:to>
+                                        <p:strVal val="visible"/>
+                                      </p:to>
+                                    </p:set>
+                                    <p:animEffect transition="in" filter="fade">
+                                      <p:cBhvr>
+                                        <p:cTn id="17" dur="500"/>
+                                        <p:tgtEl>
+                                          <p:spTgt spid="3">
+                                            <p:txEl>
+                                              <p:pRg st="2" end="2"/>
+                                            </p:txEl>
+                                          </p:spTgt>
+                                        </p:tgtEl>
+                                      </p:cBhvr>
+                                    </p:animEffect>
+                                  </p:childTnLst>
+                                </p:cTn>
+                              </p:par>
+                            </p:childTnLst>
+                          </p:cTn>
+                        </p:par>
+                      </p:childTnLst>
+                    </p:cTn>
+                  </p:par>
+                  <p:par>
+                    <p:cTn id="18" fill="hold">
+                      <p:stCondLst>
+                        <p:cond delay="indefinite"/>
+                      </p:stCondLst>
+                      <p:childTnLst>
+                        <p:par>
+                          <p:cTn id="19" fill="hold">
+                            <p:stCondLst>
+                              <p:cond delay="0"/>
+                            </p:stCondLst>
+                            <p:childTnLst>
+                              <p:par>
+                                <p:cTn id="20" presetID="10" presetClass="entr" presetSubtype="0" fill="hold" nodeType="clickEffect">
+                                  <p:stCondLst>
+                                    <p:cond delay="0"/>
+                                  </p:stCondLst>
+                                  <p:childTnLst>
+                                    <p:set>
+                                      <p:cBhvr>
+                                        <p:cTn id="21" dur="1" fill="hold">
+                                          <p:stCondLst>
+                                            <p:cond delay="0"/>
+                                          </p:stCondLst>
+                                        </p:cTn>
+                                        <p:tgtEl>
+                                          <p:spTgt spid="3">
+                                            <p:txEl>
+                                              <p:pRg st="3" end="3"/>
+                                            </p:txEl>
+                                          </p:spTgt>
+                                        </p:tgtEl>
+                                        <p:attrNameLst>
+                                          <p:attrName>style.visibility</p:attrName>
+                                        </p:attrNameLst>
+                                      </p:cBhvr>
+                                      <p:to>
+                                        <p:strVal val="visible"/>
+                                      </p:to>
+                                    </p:set>
+                                    <p:animEffect transition="in" filter="fade">
+                                      <p:cBhvr>
+                                        <p:cTn id="22" dur="500"/>
+                                        <p:tgtEl>
+                                          <p:spTgt spid="3">
+                                            <p:txEl>
+                                              <p:pRg st="3" end="3"/>
+                                            </p:txEl>
+                                          </p:spTgt>
+                                        </p:tgtEl>
+                                      </p:cBhvr>
+                                    </p:animEffect>
+                                  </p:childTnLst>
+                                </p:cTn>
+                              </p:par>
+                            </p:childTnLst>
+                          </p:cTn>
+                        </p:par>
+                      </p:childTnLst>
+                    </p:cTn>
+                  </p:par>
+                  <p:par>
+                    <p:cTn id="23" fill="hold">
+                      <p:stCondLst>
+                        <p:cond delay="indefinite"/>
+                      </p:stCondLst>
+                      <p:childTnLst>
+                        <p:par>
+                          <p:cTn id="24" fill="hold">
+                            <p:stCondLst>
+                              <p:cond delay="0"/>
+                            </p:stCondLst>
+                            <p:childTnLst>
+                              <p:par>
+                                <p:cTn id="25" presetID="10" presetClass="entr" presetSubtype="0" fill="hold" nodeType="clickEffect">
+                                  <p:stCondLst>
+                                    <p:cond delay="0"/>
+                                  </p:stCondLst>
+                                  <p:childTnLst>
+                                    <p:set>
+                                      <p:cBhvr>
+                                        <p:cTn id="26" dur="1" fill="hold">
+                                          <p:stCondLst>
+                                            <p:cond delay="0"/>
+                                          </p:stCondLst>
+                                        </p:cTn>
+                                        <p:tgtEl>
+                                          <p:spTgt spid="3">
+                                            <p:txEl>
+                                              <p:pRg st="4" end="4"/>
+                                            </p:txEl>
+                                          </p:spTgt>
+                                        </p:tgtEl>
+                                        <p:attrNameLst>
+                                          <p:attrName>style.visibility</p:attrName>
+                                        </p:attrNameLst>
+                                      </p:cBhvr>
+                                      <p:to>
+                                        <p:strVal val="visible"/>
+                                      </p:to>
+                                    </p:set>
+                                    <p:animEffect transition="in" filter="fade">
+                                      <p:cBhvr>
+                                        <p:cTn id="27" dur="500"/>
+                                        <p:tgtEl>
+                                          <p:spTgt spid="3">
+                                            <p:txEl>
+                                              <p:pRg st="4" end="4"/>
+                                            </p:txEl>
+                                          </p:spTgt>
+                                        </p:tgtEl>
+                                      </p:cBhvr>
+                                    </p:animEffect>
+                                  </p:childTnLst>
+                                </p:cTn>
+                              </p:par>
+                            </p:childTnLst>
+                          </p:cTn>
+                        </p:par>
+                      </p:childTnLst>
+                    </p:cTn>
+                  </p:par>
+                  <p:par>
+                    <p:cTn id="28" fill="hold">
+                      <p:stCondLst>
+                        <p:cond delay="indefinite"/>
+                      </p:stCondLst>
+                      <p:childTnLst>
+                        <p:par>
+                          <p:cTn id="29" fill="hold">
+                            <p:stCondLst>
+                              <p:cond delay="0"/>
+                            </p:stCondLst>
+                            <p:childTnLst>
+                              <p:par>
+                                <p:cTn id="30" presetID="10" presetClass="entr" presetSubtype="0" fill="hold" nodeType="clickEffect">
+                                  <p:stCondLst>
+                                    <p:cond delay="0"/>
+                                  </p:stCondLst>
+                                  <p:childTnLst>
+                                    <p:set>
+                                      <p:cBhvr>
+                                        <p:cTn id="31" dur="1" fill="hold">
+                                          <p:stCondLst>
+                                            <p:cond delay="0"/>
+                                          </p:stCondLst>
+                                        </p:cTn>
+                                        <p:tgtEl>
+                                          <p:spTgt spid="3">
+                                            <p:txEl>
+                                              <p:pRg st="5" end="5"/>
+                                            </p:txEl>
+                                          </p:spTgt>
+                                        </p:tgtEl>
+                                        <p:attrNameLst>
+                                          <p:attrName>style.visibility</p:attrName>
+                                        </p:attrNameLst>
+                                      </p:cBhvr>
+                                      <p:to>
+                                        <p:strVal val="visible"/>
+                                      </p:to>
+                                    </p:set>
+                                    <p:animEffect transition="in" filter="fade">
+                                      <p:cBhvr>
+                                        <p:cTn id="32" dur="500"/>
+                                        <p:tgtEl>
+                                          <p:spTgt spid="3">
+                                            <p:txEl>
+                                              <p:pRg st="5" end="5"/>
+                                            </p:txEl>
+                                          </p:spTgt>
+                                        </p:tgtEl>
+                                      </p:cBhvr>
+                                    </p:animEffect>
+                                  </p:childTnLst>
+                                </p:cTn>
+                              </p:par>
+                            </p:childTnLst>
+                          </p:cTn>
+                        </p:par>
+                      </p:childTnLst>
+                    </p:cTn>
+                  </p:par>
+                  <p:par>
+                    <p:cTn id="33" fill="hold">
+                      <p:stCondLst>
+                        <p:cond delay="indefinite"/>
+                      </p:stCondLst>
+                      <p:childTnLst>
+                        <p:par>
+                          <p:cTn id="34" fill="hold">
+                            <p:stCondLst>
+                              <p:cond delay="0"/>
+                            </p:stCondLst>
+                            <p:childTnLst>
+                              <p:par>
+                                <p:cTn id="35" presetID="10" presetClass="entr" presetSubtype="0" fill="hold" nodeType="clickEffect">
+                                  <p:stCondLst>
+                                    <p:cond delay="0"/>
+                                  </p:stCondLst>
+                                  <p:childTnLst>
+                                    <p:set>
+                                      <p:cBhvr>
+                                        <p:cTn id="36" dur="1" fill="hold">
+                                          <p:stCondLst>
+                                            <p:cond delay="0"/>
+                                          </p:stCondLst>
+                                        </p:cTn>
+                                        <p:tgtEl>
+                                          <p:spTgt spid="3">
+                                            <p:txEl>
+                                              <p:pRg st="6" end="6"/>
+                                            </p:txEl>
+                                          </p:spTgt>
+                                        </p:tgtEl>
+                                        <p:attrNameLst>
+                                          <p:attrName>style.visibility</p:attrName>
+                                        </p:attrNameLst>
+                                      </p:cBhvr>
+                                      <p:to>
+                                        <p:strVal val="visible"/>
+                                      </p:to>
+                                    </p:set>
+                                    <p:animEffect transition="in" filter="fade">
+                                      <p:cBhvr>
+                                        <p:cTn id="37" dur="500"/>
+                                        <p:tgtEl>
+                                          <p:spTgt spid="3">
+                                            <p:txEl>
+                                              <p:pRg st="6" end="6"/>
+                                            </p:txEl>
+                                          </p:spTgt>
+                                        </p:tgtEl>
+                                      </p:cBhvr>
+                                    </p:animEffect>
+                                  </p:childTnLst>
+                                </p:cTn>
+                              </p:par>
+                            </p:childTnLst>
+                          </p:cTn>
+                        </p:par>
+                      </p:childTnLst>
+                    </p:cTn>
+                  </p:par>
+                  <p:par>
+                    <p:cTn id="38" fill="hold">
+                      <p:stCondLst>
+                        <p:cond delay="indefinite"/>
+                      </p:stCondLst>
+                      <p:childTnLst>
+                        <p:par>
+                          <p:cTn id="39" fill="hold">
+                            <p:stCondLst>
+                              <p:cond delay="0"/>
+                            </p:stCondLst>
+                            <p:childTnLst>
+                              <p:par>
+                                <p:cTn id="40" presetID="10" presetClass="entr" presetSubtype="0" fill="hold" nodeType="clickEffect">
+                                  <p:stCondLst>
+                                    <p:cond delay="0"/>
+                                  </p:stCondLst>
+                                  <p:childTnLst>
+                                    <p:set>
+                                      <p:cBhvr>
+                                        <p:cTn id="41" dur="1" fill="hold">
+                                          <p:stCondLst>
+                                            <p:cond delay="0"/>
+                                          </p:stCondLst>
+                                        </p:cTn>
+                                        <p:tgtEl>
+                                          <p:spTgt spid="3">
+                                            <p:txEl>
+                                              <p:pRg st="7" end="7"/>
+                                            </p:txEl>
+                                          </p:spTgt>
+                                        </p:tgtEl>
+                                        <p:attrNameLst>
+                                          <p:attrName>style.visibility</p:attrName>
+                                        </p:attrNameLst>
+                                      </p:cBhvr>
+                                      <p:to>
+                                        <p:strVal val="visible"/>
+                                      </p:to>
+                                    </p:set>
+                                    <p:animEffect transition="in" filter="fade">
+                                      <p:cBhvr>
+                                        <p:cTn id="42" dur="500"/>
+                                        <p:tgtEl>
+                                          <p:spTgt spid="3">
+                                            <p:txEl>
+                                              <p:pRg st="7" end="7"/>
+                                            </p:txEl>
+                                          </p:spTgt>
+                                        </p:tgtEl>
+                                      </p:cBhvr>
+                                    </p:animEffect>
+                                  </p:childTnLst>
+                                </p:cTn>
+                              </p:par>
+                            </p:childTnLst>
+                          </p:cTn>
+                        </p:par>
+                      </p:childTnLst>
+                    </p:cTn>
+                  </p:par>
+                  <p:par>
+                    <p:cTn id="43" fill="hold">
+                      <p:stCondLst>
+                        <p:cond delay="indefinite"/>
+                      </p:stCondLst>
+                      <p:childTnLst>
+                        <p:par>
+                          <p:cTn id="44" fill="hold">
+                            <p:stCondLst>
+                              <p:cond delay="0"/>
+                            </p:stCondLst>
+                            <p:childTnLst>
+                              <p:par>
+                                <p:cTn id="45" presetID="10" presetClass="entr" presetSubtype="0" fill="hold" nodeType="clickEffect">
+                                  <p:stCondLst>
+                                    <p:cond delay="0"/>
+                                  </p:stCondLst>
+                                  <p:childTnLst>
+                                    <p:set>
+                                      <p:cBhvr>
+                                        <p:cTn id="46" dur="1" fill="hold">
+                                          <p:stCondLst>
+                                            <p:cond delay="0"/>
+                                          </p:stCondLst>
+                                        </p:cTn>
+                                        <p:tgtEl>
+                                          <p:spTgt spid="3">
+                                            <p:txEl>
+                                              <p:pRg st="8" end="8"/>
+                                            </p:txEl>
+                                          </p:spTgt>
+                                        </p:tgtEl>
+                                        <p:attrNameLst>
+                                          <p:attrName>style.visibility</p:attrName>
+                                        </p:attrNameLst>
+                                      </p:cBhvr>
+                                      <p:to>
+                                        <p:strVal val="visible"/>
+                                      </p:to>
+                                    </p:set>
+                                    <p:animEffect transition="in" filter="fade">
+                                      <p:cBhvr>
+                                        <p:cTn id="47" dur="500"/>
+                                        <p:tgtEl>
+                                          <p:spTgt spid="3">
+                                            <p:txEl>
+                                              <p:pRg st="8" end="8"/>
+                                            </p:txEl>
+                                          </p:spTgt>
+                                        </p:tgtEl>
+                                      </p:cBhvr>
+                                    </p:animEffect>
+                                  </p:childTnLst>
+                                </p:cTn>
+                              </p:par>
+                            </p:childTnLst>
+                          </p:cTn>
+                        </p:par>
+                      </p:childTnLst>
+                    </p:cTn>
+                  </p:par>
+                </p:childTnLst>
+              </p:cTn>
+              <p:prevCondLst>
+                <p:cond evt="onPrev" delay="0">
+                  <p:tgtEl>
+                    <p:sldTgt/>
+                  </p:tgtEl>
+                </p:cond>
+              </p:prevCondLst>
+              <p:nextCondLst>
+                <p:cond evt="onNext" delay="0">
+                  <p:tgtEl>
+                    <p:sldTgt/>
+                  </p:tgtEl>
+                </p:cond>
+              </p:nextCondLst>
+            </p:seq>
+          </p:childTnLst>
+        </p:cTn>
+      </p:par>
+    </p:tnLst>
+  </p:timing>
 </p:sld>
 </file>
 
@@ -6017,7 +7857,7 @@
                 <a:latin typeface="Poppins" panose="00000500000000000000" pitchFamily="2" charset="0"/>
                 <a:cs typeface="Poppins" panose="00000500000000000000" pitchFamily="2" charset="0"/>
               </a:rPr>
-              <a:t>: Easily add a «contact us» form to your website.</a:t>
+              <a:t>: Easily add a «contact us» form to your website</a:t>
             </a:r>
           </a:p>
           <a:p>
@@ -6108,7 +7948,7 @@
                 <a:latin typeface="Poppins" panose="00000500000000000000" pitchFamily="2" charset="0"/>
                 <a:cs typeface="Poppins" panose="00000500000000000000" pitchFamily="2" charset="0"/>
               </a:rPr>
-              <a:t>: Create quick polls for your users.</a:t>
+              <a:t>: Create quick polls for your users</a:t>
             </a:r>
           </a:p>
           <a:p>
@@ -6176,6 +8016,341 @@
   <p:clrMapOvr>
     <a:masterClrMapping/>
   </p:clrMapOvr>
+  <p:timing>
+    <p:tnLst>
+      <p:par>
+        <p:cTn id="1" dur="indefinite" restart="never" nodeType="tmRoot">
+          <p:childTnLst>
+            <p:seq concurrent="1" nextAc="seek">
+              <p:cTn id="2" dur="indefinite" nodeType="mainSeq">
+                <p:childTnLst>
+                  <p:par>
+                    <p:cTn id="3" fill="hold">
+                      <p:stCondLst>
+                        <p:cond delay="indefinite"/>
+                      </p:stCondLst>
+                      <p:childTnLst>
+                        <p:par>
+                          <p:cTn id="4" fill="hold">
+                            <p:stCondLst>
+                              <p:cond delay="0"/>
+                            </p:stCondLst>
+                            <p:childTnLst>
+                              <p:par>
+                                <p:cTn id="5" presetID="10" presetClass="entr" presetSubtype="0" fill="hold" nodeType="clickEffect">
+                                  <p:stCondLst>
+                                    <p:cond delay="0"/>
+                                  </p:stCondLst>
+                                  <p:childTnLst>
+                                    <p:set>
+                                      <p:cBhvr>
+                                        <p:cTn id="6" dur="1" fill="hold">
+                                          <p:stCondLst>
+                                            <p:cond delay="0"/>
+                                          </p:stCondLst>
+                                        </p:cTn>
+                                        <p:tgtEl>
+                                          <p:spTgt spid="3">
+                                            <p:txEl>
+                                              <p:pRg st="0" end="0"/>
+                                            </p:txEl>
+                                          </p:spTgt>
+                                        </p:tgtEl>
+                                        <p:attrNameLst>
+                                          <p:attrName>style.visibility</p:attrName>
+                                        </p:attrNameLst>
+                                      </p:cBhvr>
+                                      <p:to>
+                                        <p:strVal val="visible"/>
+                                      </p:to>
+                                    </p:set>
+                                    <p:animEffect transition="in" filter="fade">
+                                      <p:cBhvr>
+                                        <p:cTn id="7" dur="500"/>
+                                        <p:tgtEl>
+                                          <p:spTgt spid="3">
+                                            <p:txEl>
+                                              <p:pRg st="0" end="0"/>
+                                            </p:txEl>
+                                          </p:spTgt>
+                                        </p:tgtEl>
+                                      </p:cBhvr>
+                                    </p:animEffect>
+                                  </p:childTnLst>
+                                </p:cTn>
+                              </p:par>
+                            </p:childTnLst>
+                          </p:cTn>
+                        </p:par>
+                      </p:childTnLst>
+                    </p:cTn>
+                  </p:par>
+                  <p:par>
+                    <p:cTn id="8" fill="hold">
+                      <p:stCondLst>
+                        <p:cond delay="indefinite"/>
+                      </p:stCondLst>
+                      <p:childTnLst>
+                        <p:par>
+                          <p:cTn id="9" fill="hold">
+                            <p:stCondLst>
+                              <p:cond delay="0"/>
+                            </p:stCondLst>
+                            <p:childTnLst>
+                              <p:par>
+                                <p:cTn id="10" presetID="10" presetClass="entr" presetSubtype="0" fill="hold" nodeType="clickEffect">
+                                  <p:stCondLst>
+                                    <p:cond delay="0"/>
+                                  </p:stCondLst>
+                                  <p:childTnLst>
+                                    <p:set>
+                                      <p:cBhvr>
+                                        <p:cTn id="11" dur="1" fill="hold">
+                                          <p:stCondLst>
+                                            <p:cond delay="0"/>
+                                          </p:stCondLst>
+                                        </p:cTn>
+                                        <p:tgtEl>
+                                          <p:spTgt spid="3">
+                                            <p:txEl>
+                                              <p:pRg st="1" end="1"/>
+                                            </p:txEl>
+                                          </p:spTgt>
+                                        </p:tgtEl>
+                                        <p:attrNameLst>
+                                          <p:attrName>style.visibility</p:attrName>
+                                        </p:attrNameLst>
+                                      </p:cBhvr>
+                                      <p:to>
+                                        <p:strVal val="visible"/>
+                                      </p:to>
+                                    </p:set>
+                                    <p:animEffect transition="in" filter="fade">
+                                      <p:cBhvr>
+                                        <p:cTn id="12" dur="500"/>
+                                        <p:tgtEl>
+                                          <p:spTgt spid="3">
+                                            <p:txEl>
+                                              <p:pRg st="1" end="1"/>
+                                            </p:txEl>
+                                          </p:spTgt>
+                                        </p:tgtEl>
+                                      </p:cBhvr>
+                                    </p:animEffect>
+                                  </p:childTnLst>
+                                </p:cTn>
+                              </p:par>
+                            </p:childTnLst>
+                          </p:cTn>
+                        </p:par>
+                      </p:childTnLst>
+                    </p:cTn>
+                  </p:par>
+                  <p:par>
+                    <p:cTn id="13" fill="hold">
+                      <p:stCondLst>
+                        <p:cond delay="indefinite"/>
+                      </p:stCondLst>
+                      <p:childTnLst>
+                        <p:par>
+                          <p:cTn id="14" fill="hold">
+                            <p:stCondLst>
+                              <p:cond delay="0"/>
+                            </p:stCondLst>
+                            <p:childTnLst>
+                              <p:par>
+                                <p:cTn id="15" presetID="10" presetClass="entr" presetSubtype="0" fill="hold" nodeType="clickEffect">
+                                  <p:stCondLst>
+                                    <p:cond delay="0"/>
+                                  </p:stCondLst>
+                                  <p:childTnLst>
+                                    <p:set>
+                                      <p:cBhvr>
+                                        <p:cTn id="16" dur="1" fill="hold">
+                                          <p:stCondLst>
+                                            <p:cond delay="0"/>
+                                          </p:stCondLst>
+                                        </p:cTn>
+                                        <p:tgtEl>
+                                          <p:spTgt spid="3">
+                                            <p:txEl>
+                                              <p:pRg st="2" end="2"/>
+                                            </p:txEl>
+                                          </p:spTgt>
+                                        </p:tgtEl>
+                                        <p:attrNameLst>
+                                          <p:attrName>style.visibility</p:attrName>
+                                        </p:attrNameLst>
+                                      </p:cBhvr>
+                                      <p:to>
+                                        <p:strVal val="visible"/>
+                                      </p:to>
+                                    </p:set>
+                                    <p:animEffect transition="in" filter="fade">
+                                      <p:cBhvr>
+                                        <p:cTn id="17" dur="500"/>
+                                        <p:tgtEl>
+                                          <p:spTgt spid="3">
+                                            <p:txEl>
+                                              <p:pRg st="2" end="2"/>
+                                            </p:txEl>
+                                          </p:spTgt>
+                                        </p:tgtEl>
+                                      </p:cBhvr>
+                                    </p:animEffect>
+                                  </p:childTnLst>
+                                </p:cTn>
+                              </p:par>
+                            </p:childTnLst>
+                          </p:cTn>
+                        </p:par>
+                      </p:childTnLst>
+                    </p:cTn>
+                  </p:par>
+                  <p:par>
+                    <p:cTn id="18" fill="hold">
+                      <p:stCondLst>
+                        <p:cond delay="indefinite"/>
+                      </p:stCondLst>
+                      <p:childTnLst>
+                        <p:par>
+                          <p:cTn id="19" fill="hold">
+                            <p:stCondLst>
+                              <p:cond delay="0"/>
+                            </p:stCondLst>
+                            <p:childTnLst>
+                              <p:par>
+                                <p:cTn id="20" presetID="10" presetClass="entr" presetSubtype="0" fill="hold" nodeType="clickEffect">
+                                  <p:stCondLst>
+                                    <p:cond delay="0"/>
+                                  </p:stCondLst>
+                                  <p:childTnLst>
+                                    <p:set>
+                                      <p:cBhvr>
+                                        <p:cTn id="21" dur="1" fill="hold">
+                                          <p:stCondLst>
+                                            <p:cond delay="0"/>
+                                          </p:stCondLst>
+                                        </p:cTn>
+                                        <p:tgtEl>
+                                          <p:spTgt spid="3">
+                                            <p:txEl>
+                                              <p:pRg st="3" end="3"/>
+                                            </p:txEl>
+                                          </p:spTgt>
+                                        </p:tgtEl>
+                                        <p:attrNameLst>
+                                          <p:attrName>style.visibility</p:attrName>
+                                        </p:attrNameLst>
+                                      </p:cBhvr>
+                                      <p:to>
+                                        <p:strVal val="visible"/>
+                                      </p:to>
+                                    </p:set>
+                                    <p:animEffect transition="in" filter="fade">
+                                      <p:cBhvr>
+                                        <p:cTn id="22" dur="500"/>
+                                        <p:tgtEl>
+                                          <p:spTgt spid="3">
+                                            <p:txEl>
+                                              <p:pRg st="3" end="3"/>
+                                            </p:txEl>
+                                          </p:spTgt>
+                                        </p:tgtEl>
+                                      </p:cBhvr>
+                                    </p:animEffect>
+                                  </p:childTnLst>
+                                </p:cTn>
+                              </p:par>
+                            </p:childTnLst>
+                          </p:cTn>
+                        </p:par>
+                      </p:childTnLst>
+                    </p:cTn>
+                  </p:par>
+                  <p:par>
+                    <p:cTn id="23" fill="hold">
+                      <p:stCondLst>
+                        <p:cond delay="indefinite"/>
+                      </p:stCondLst>
+                      <p:childTnLst>
+                        <p:par>
+                          <p:cTn id="24" fill="hold">
+                            <p:stCondLst>
+                              <p:cond delay="0"/>
+                            </p:stCondLst>
+                            <p:childTnLst>
+                              <p:par>
+                                <p:cTn id="25" presetID="10" presetClass="entr" presetSubtype="0" fill="hold" nodeType="clickEffect">
+                                  <p:stCondLst>
+                                    <p:cond delay="0"/>
+                                  </p:stCondLst>
+                                  <p:childTnLst>
+                                    <p:set>
+                                      <p:cBhvr>
+                                        <p:cTn id="26" dur="1" fill="hold">
+                                          <p:stCondLst>
+                                            <p:cond delay="0"/>
+                                          </p:stCondLst>
+                                        </p:cTn>
+                                        <p:tgtEl>
+                                          <p:spTgt spid="3">
+                                            <p:txEl>
+                                              <p:pRg st="4" end="4"/>
+                                            </p:txEl>
+                                          </p:spTgt>
+                                        </p:tgtEl>
+                                        <p:attrNameLst>
+                                          <p:attrName>style.visibility</p:attrName>
+                                        </p:attrNameLst>
+                                      </p:cBhvr>
+                                      <p:to>
+                                        <p:strVal val="visible"/>
+                                      </p:to>
+                                    </p:set>
+                                    <p:animEffect transition="in" filter="fade">
+                                      <p:cBhvr>
+                                        <p:cTn id="27" dur="500"/>
+                                        <p:tgtEl>
+                                          <p:spTgt spid="3">
+                                            <p:txEl>
+                                              <p:pRg st="4" end="4"/>
+                                            </p:txEl>
+                                          </p:spTgt>
+                                        </p:tgtEl>
+                                      </p:cBhvr>
+                                    </p:animEffect>
+                                  </p:childTnLst>
+                                </p:cTn>
+                              </p:par>
+                            </p:childTnLst>
+                          </p:cTn>
+                        </p:par>
+                      </p:childTnLst>
+                    </p:cTn>
+                  </p:par>
+                </p:childTnLst>
+              </p:cTn>
+              <p:prevCondLst>
+                <p:cond evt="onPrev" delay="0">
+                  <p:tgtEl>
+                    <p:sldTgt/>
+                  </p:tgtEl>
+                </p:cond>
+              </p:prevCondLst>
+              <p:nextCondLst>
+                <p:cond evt="onNext" delay="0">
+                  <p:tgtEl>
+                    <p:sldTgt/>
+                  </p:tgtEl>
+                </p:cond>
+              </p:nextCondLst>
+            </p:seq>
+          </p:childTnLst>
+        </p:cTn>
+      </p:par>
+    </p:tnLst>
+  </p:timing>
 </p:sld>
 </file>
 
@@ -7044,6 +9219,195 @@
   <p:clrMapOvr>
     <a:masterClrMapping/>
   </p:clrMapOvr>
+  <p:timing>
+    <p:tnLst>
+      <p:par>
+        <p:cTn id="1" dur="indefinite" restart="never" nodeType="tmRoot">
+          <p:childTnLst>
+            <p:seq concurrent="1" nextAc="seek">
+              <p:cTn id="2" dur="indefinite" nodeType="mainSeq">
+                <p:childTnLst>
+                  <p:par>
+                    <p:cTn id="3" fill="hold">
+                      <p:stCondLst>
+                        <p:cond delay="indefinite"/>
+                      </p:stCondLst>
+                      <p:childTnLst>
+                        <p:par>
+                          <p:cTn id="4" fill="hold">
+                            <p:stCondLst>
+                              <p:cond delay="0"/>
+                            </p:stCondLst>
+                            <p:childTnLst>
+                              <p:par>
+                                <p:cTn id="5" presetID="10" presetClass="entr" presetSubtype="0" fill="hold" nodeType="clickEffect">
+                                  <p:stCondLst>
+                                    <p:cond delay="0"/>
+                                  </p:stCondLst>
+                                  <p:childTnLst>
+                                    <p:set>
+                                      <p:cBhvr>
+                                        <p:cTn id="6" dur="1" fill="hold">
+                                          <p:stCondLst>
+                                            <p:cond delay="0"/>
+                                          </p:stCondLst>
+                                        </p:cTn>
+                                        <p:tgtEl>
+                                          <p:spTgt spid="4"/>
+                                        </p:tgtEl>
+                                        <p:attrNameLst>
+                                          <p:attrName>style.visibility</p:attrName>
+                                        </p:attrNameLst>
+                                      </p:cBhvr>
+                                      <p:to>
+                                        <p:strVal val="visible"/>
+                                      </p:to>
+                                    </p:set>
+                                    <p:animEffect transition="in" filter="fade">
+                                      <p:cBhvr>
+                                        <p:cTn id="7" dur="500"/>
+                                        <p:tgtEl>
+                                          <p:spTgt spid="4"/>
+                                        </p:tgtEl>
+                                      </p:cBhvr>
+                                    </p:animEffect>
+                                  </p:childTnLst>
+                                </p:cTn>
+                              </p:par>
+                            </p:childTnLst>
+                          </p:cTn>
+                        </p:par>
+                      </p:childTnLst>
+                    </p:cTn>
+                  </p:par>
+                  <p:par>
+                    <p:cTn id="8" fill="hold">
+                      <p:stCondLst>
+                        <p:cond delay="indefinite"/>
+                      </p:stCondLst>
+                      <p:childTnLst>
+                        <p:par>
+                          <p:cTn id="9" fill="hold">
+                            <p:stCondLst>
+                              <p:cond delay="0"/>
+                            </p:stCondLst>
+                            <p:childTnLst>
+                              <p:par>
+                                <p:cTn id="10" presetID="10" presetClass="entr" presetSubtype="0" fill="hold" nodeType="clickEffect">
+                                  <p:stCondLst>
+                                    <p:cond delay="0"/>
+                                  </p:stCondLst>
+                                  <p:childTnLst>
+                                    <p:set>
+                                      <p:cBhvr>
+                                        <p:cTn id="11" dur="1" fill="hold">
+                                          <p:stCondLst>
+                                            <p:cond delay="0"/>
+                                          </p:stCondLst>
+                                        </p:cTn>
+                                        <p:tgtEl>
+                                          <p:spTgt spid="6"/>
+                                        </p:tgtEl>
+                                        <p:attrNameLst>
+                                          <p:attrName>style.visibility</p:attrName>
+                                        </p:attrNameLst>
+                                      </p:cBhvr>
+                                      <p:to>
+                                        <p:strVal val="visible"/>
+                                      </p:to>
+                                    </p:set>
+                                    <p:animEffect transition="in" filter="fade">
+                                      <p:cBhvr>
+                                        <p:cTn id="12" dur="500"/>
+                                        <p:tgtEl>
+                                          <p:spTgt spid="6"/>
+                                        </p:tgtEl>
+                                      </p:cBhvr>
+                                    </p:animEffect>
+                                  </p:childTnLst>
+                                </p:cTn>
+                              </p:par>
+                            </p:childTnLst>
+                          </p:cTn>
+                        </p:par>
+                      </p:childTnLst>
+                    </p:cTn>
+                  </p:par>
+                  <p:par>
+                    <p:cTn id="13" fill="hold">
+                      <p:stCondLst>
+                        <p:cond delay="indefinite"/>
+                      </p:stCondLst>
+                      <p:childTnLst>
+                        <p:par>
+                          <p:cTn id="14" fill="hold">
+                            <p:stCondLst>
+                              <p:cond delay="0"/>
+                            </p:stCondLst>
+                            <p:childTnLst>
+                              <p:par>
+                                <p:cTn id="15" presetID="10" presetClass="entr" presetSubtype="0" fill="hold" nodeType="clickEffect">
+                                  <p:stCondLst>
+                                    <p:cond delay="0"/>
+                                  </p:stCondLst>
+                                  <p:childTnLst>
+                                    <p:set>
+                                      <p:cBhvr>
+                                        <p:cTn id="16" dur="1" fill="hold">
+                                          <p:stCondLst>
+                                            <p:cond delay="0"/>
+                                          </p:stCondLst>
+                                        </p:cTn>
+                                        <p:tgtEl>
+                                          <p:spTgt spid="9"/>
+                                        </p:tgtEl>
+                                        <p:attrNameLst>
+                                          <p:attrName>style.visibility</p:attrName>
+                                        </p:attrNameLst>
+                                      </p:cBhvr>
+                                      <p:to>
+                                        <p:strVal val="visible"/>
+                                      </p:to>
+                                    </p:set>
+                                    <p:animEffect transition="in" filter="fade">
+                                      <p:cBhvr>
+                                        <p:cTn id="17" dur="500"/>
+                                        <p:tgtEl>
+                                          <p:spTgt spid="9"/>
+                                        </p:tgtEl>
+                                      </p:cBhvr>
+                                    </p:animEffect>
+                                  </p:childTnLst>
+                                </p:cTn>
+                              </p:par>
+                            </p:childTnLst>
+                          </p:cTn>
+                        </p:par>
+                      </p:childTnLst>
+                    </p:cTn>
+                  </p:par>
+                </p:childTnLst>
+              </p:cTn>
+              <p:prevCondLst>
+                <p:cond evt="onPrev" delay="0">
+                  <p:tgtEl>
+                    <p:sldTgt/>
+                  </p:tgtEl>
+                </p:cond>
+              </p:prevCondLst>
+              <p:nextCondLst>
+                <p:cond evt="onNext" delay="0">
+                  <p:tgtEl>
+                    <p:sldTgt/>
+                  </p:tgtEl>
+                </p:cond>
+              </p:nextCondLst>
+            </p:seq>
+          </p:childTnLst>
+        </p:cTn>
+      </p:par>
+    </p:tnLst>
+  </p:timing>
 </p:sld>
 </file>
 

</xml_diff>